<commit_message>
updated slide 28 on social media task
</commit_message>
<xml_diff>
--- a/public/js/tasks/social_media/media/Social_media_task_instructions_07_27_2022.pptx
+++ b/public/js/tasks/social_media/media/Social_media_task_instructions_07_27_2022.pptx
@@ -23169,10 +23169,10 @@
       </p:sp>
       <p:pic>
         <p:nvPicPr>
-          <p:cNvPr id="4" name="Picture 3" descr="Graphical user interface&#10;&#10;Description automatically generated">
+          <p:cNvPr id="5" name="Picture 4" descr="Graphical user interface, application&#10;&#10;Description automatically generated">
             <a:extLst>
               <a:ext uri="{FF2B5EF4-FFF2-40B4-BE49-F238E27FC236}">
-                <a16:creationId xmlns:a16="http://schemas.microsoft.com/office/drawing/2014/main" id="{FB9DFDF3-37AA-2849-B2C9-294BE9799373}"/>
+                <a16:creationId xmlns:a16="http://schemas.microsoft.com/office/drawing/2014/main" id="{45BC9D52-C37A-1A4D-ACE1-5B5D49B70B35}"/>
               </a:ext>
             </a:extLst>
           </p:cNvPr>
@@ -23189,8 +23189,8 @@
         </p:blipFill>
         <p:spPr>
           <a:xfrm>
-            <a:off x="3699814" y="3145589"/>
-            <a:ext cx="4792369" cy="2864529"/>
+            <a:off x="3241939" y="3020910"/>
+            <a:ext cx="5708119" cy="3035681"/>
           </a:xfrm>
           <a:prstGeom prst="rect">
             <a:avLst/>

</xml_diff>

<commit_message>
fixed instruction typos - #25
</commit_message>
<xml_diff>
--- a/public/js/tasks/social_media/media/Social_media_task_instructions_07_27_2022.pptx
+++ b/public/js/tasks/social_media/media/Social_media_task_instructions_07_27_2022.pptx
@@ -293,7 +293,7 @@
           <a:p>
             <a:fld id="{5ACDFB13-8C7E-2148-B293-047F9641DD71}" type="datetimeFigureOut">
               <a:rPr lang="en-US" smtClean="0"/>
-              <a:t>7/27/22</a:t>
+              <a:t>8/8/22</a:t>
             </a:fld>
             <a:endParaRPr lang="en-US" dirty="0"/>
           </a:p>
@@ -4191,7 +4191,7 @@
           <a:p>
             <a:fld id="{E69A4D3A-6EF8-7448-AC6F-AD52FEDAA6A8}" type="datetimeFigureOut">
               <a:rPr lang="en-US" smtClean="0"/>
-              <a:t>7/27/22</a:t>
+              <a:t>8/8/22</a:t>
             </a:fld>
             <a:endParaRPr lang="en-US" dirty="0"/>
           </a:p>
@@ -4359,7 +4359,7 @@
           <a:p>
             <a:fld id="{E69A4D3A-6EF8-7448-AC6F-AD52FEDAA6A8}" type="datetimeFigureOut">
               <a:rPr lang="en-US" smtClean="0"/>
-              <a:t>7/27/22</a:t>
+              <a:t>8/8/22</a:t>
             </a:fld>
             <a:endParaRPr lang="en-US" dirty="0"/>
           </a:p>
@@ -4537,7 +4537,7 @@
           <a:p>
             <a:fld id="{E69A4D3A-6EF8-7448-AC6F-AD52FEDAA6A8}" type="datetimeFigureOut">
               <a:rPr lang="en-US" smtClean="0"/>
-              <a:t>7/27/22</a:t>
+              <a:t>8/8/22</a:t>
             </a:fld>
             <a:endParaRPr lang="en-US" dirty="0"/>
           </a:p>
@@ -4705,7 +4705,7 @@
           <a:p>
             <a:fld id="{E69A4D3A-6EF8-7448-AC6F-AD52FEDAA6A8}" type="datetimeFigureOut">
               <a:rPr lang="en-US" smtClean="0"/>
-              <a:t>7/27/22</a:t>
+              <a:t>8/8/22</a:t>
             </a:fld>
             <a:endParaRPr lang="en-US" dirty="0"/>
           </a:p>
@@ -4950,7 +4950,7 @@
           <a:p>
             <a:fld id="{E69A4D3A-6EF8-7448-AC6F-AD52FEDAA6A8}" type="datetimeFigureOut">
               <a:rPr lang="en-US" smtClean="0"/>
-              <a:t>7/27/22</a:t>
+              <a:t>8/8/22</a:t>
             </a:fld>
             <a:endParaRPr lang="en-US" dirty="0"/>
           </a:p>
@@ -5235,7 +5235,7 @@
           <a:p>
             <a:fld id="{E69A4D3A-6EF8-7448-AC6F-AD52FEDAA6A8}" type="datetimeFigureOut">
               <a:rPr lang="en-US" smtClean="0"/>
-              <a:t>7/27/22</a:t>
+              <a:t>8/8/22</a:t>
             </a:fld>
             <a:endParaRPr lang="en-US" dirty="0"/>
           </a:p>
@@ -5654,7 +5654,7 @@
           <a:p>
             <a:fld id="{E69A4D3A-6EF8-7448-AC6F-AD52FEDAA6A8}" type="datetimeFigureOut">
               <a:rPr lang="en-US" smtClean="0"/>
-              <a:t>7/27/22</a:t>
+              <a:t>8/8/22</a:t>
             </a:fld>
             <a:endParaRPr lang="en-US" dirty="0"/>
           </a:p>
@@ -5771,7 +5771,7 @@
           <a:p>
             <a:fld id="{E69A4D3A-6EF8-7448-AC6F-AD52FEDAA6A8}" type="datetimeFigureOut">
               <a:rPr lang="en-US" smtClean="0"/>
-              <a:t>7/27/22</a:t>
+              <a:t>8/8/22</a:t>
             </a:fld>
             <a:endParaRPr lang="en-US" dirty="0"/>
           </a:p>
@@ -5866,7 +5866,7 @@
           <a:p>
             <a:fld id="{E69A4D3A-6EF8-7448-AC6F-AD52FEDAA6A8}" type="datetimeFigureOut">
               <a:rPr lang="en-US" smtClean="0"/>
-              <a:t>7/27/22</a:t>
+              <a:t>8/8/22</a:t>
             </a:fld>
             <a:endParaRPr lang="en-US" dirty="0"/>
           </a:p>
@@ -6141,7 +6141,7 @@
           <a:p>
             <a:fld id="{E69A4D3A-6EF8-7448-AC6F-AD52FEDAA6A8}" type="datetimeFigureOut">
               <a:rPr lang="en-US" smtClean="0"/>
-              <a:t>7/27/22</a:t>
+              <a:t>8/8/22</a:t>
             </a:fld>
             <a:endParaRPr lang="en-US" dirty="0"/>
           </a:p>
@@ -6396,7 +6396,7 @@
           <a:p>
             <a:fld id="{E69A4D3A-6EF8-7448-AC6F-AD52FEDAA6A8}" type="datetimeFigureOut">
               <a:rPr lang="en-US" smtClean="0"/>
-              <a:t>7/27/22</a:t>
+              <a:t>8/8/22</a:t>
             </a:fld>
             <a:endParaRPr lang="en-US" dirty="0"/>
           </a:p>
@@ -6610,7 +6610,7 @@
           <a:p>
             <a:fld id="{E69A4D3A-6EF8-7448-AC6F-AD52FEDAA6A8}" type="datetimeFigureOut">
               <a:rPr lang="en-US" smtClean="0"/>
-              <a:t>7/27/22</a:t>
+              <a:t>8/8/22</a:t>
             </a:fld>
             <a:endParaRPr lang="en-US" dirty="0"/>
           </a:p>
@@ -21663,7 +21663,7 @@
                   <a:srgbClr val="00FF00"/>
                 </a:solidFill>
               </a:rPr>
-              <a:t>chatrooms</a:t>
+              <a:t>chatroom</a:t>
             </a:r>
             <a:r>
               <a:rPr lang="en-US" dirty="0"/>
@@ -22483,7 +22483,7 @@
             </a:r>
             <a:r>
               <a:rPr lang="en-US" sz="2400" dirty="0"/>
-              <a:t> after each choice will lead to greater drop in your </a:t>
+              <a:t> after each choice will lead to greater drops in your </a:t>
             </a:r>
             <a:r>
               <a:rPr lang="en-US" sz="2400" dirty="0">

</xml_diff>